<commit_message>
Updated with more slides
</commit_message>
<xml_diff>
--- a/Presentation RMCH Unit.pptx
+++ b/Presentation RMCH Unit.pptx
@@ -14,6 +14,7 @@
     <p:sldId id="266" r:id="rId8"/>
     <p:sldId id="262" r:id="rId9"/>
     <p:sldId id="268" r:id="rId10"/>
+    <p:sldId id="269" r:id="rId11"/>
   </p:sldIdLst>
   <p:sldSz cx="12192000" cy="6858000"/>
   <p:notesSz cx="6858000" cy="9144000"/>
@@ -123,6 +124,7 @@
 <file path=ppt/revisionInfo.xml><?xml version="1.0" encoding="utf-8"?>
 <p1510:revInfo xmlns:a="http://schemas.openxmlformats.org/drawingml/2006/main" xmlns:r="http://schemas.openxmlformats.org/officeDocument/2006/relationships" xmlns:p1510="http://schemas.microsoft.com/office/powerpoint/2015/10/main">
   <p1510:revLst>
+    <p1510:client id="{39B79FE7-C65C-4744-A5F9-1A7D979444EA}" v="2824" dt="2021-02-09T16:28:30.419"/>
     <p1510:client id="{40A3309F-A14A-4255-A73A-00BA0BEEC9D7}" v="157" dt="2021-02-08T19:05:12.679"/>
     <p1510:client id="{74C168C7-3501-4AC4-880A-8F91D094CB35}" v="3724" dt="2021-02-08T19:00:54.966"/>
     <p1510:client id="{DDA13561-B690-43CC-A3FA-D12BECDC5F54}" v="1108" dt="2021-02-08T04:14:15.006"/>
@@ -262,7 +264,7 @@
           <a:p>
             <a:fld id="{846CE7D5-CF57-46EF-B807-FDD0502418D4}" type="datetimeFigureOut">
               <a:rPr lang="en-US" smtClean="0"/>
-              <a:t>2/8/2021</a:t>
+              <a:t>2/9/2021</a:t>
             </a:fld>
             <a:endParaRPr lang="en-US"/>
           </a:p>
@@ -432,7 +434,7 @@
           <a:p>
             <a:fld id="{846CE7D5-CF57-46EF-B807-FDD0502418D4}" type="datetimeFigureOut">
               <a:rPr lang="en-US" smtClean="0"/>
-              <a:t>2/8/2021</a:t>
+              <a:t>2/9/2021</a:t>
             </a:fld>
             <a:endParaRPr lang="en-US"/>
           </a:p>
@@ -612,7 +614,7 @@
           <a:p>
             <a:fld id="{846CE7D5-CF57-46EF-B807-FDD0502418D4}" type="datetimeFigureOut">
               <a:rPr lang="en-US" smtClean="0"/>
-              <a:t>2/8/2021</a:t>
+              <a:t>2/9/2021</a:t>
             </a:fld>
             <a:endParaRPr lang="en-US"/>
           </a:p>
@@ -782,7 +784,7 @@
           <a:p>
             <a:fld id="{846CE7D5-CF57-46EF-B807-FDD0502418D4}" type="datetimeFigureOut">
               <a:rPr lang="en-US" smtClean="0"/>
-              <a:t>2/8/2021</a:t>
+              <a:t>2/9/2021</a:t>
             </a:fld>
             <a:endParaRPr lang="en-US"/>
           </a:p>
@@ -1028,7 +1030,7 @@
           <a:p>
             <a:fld id="{846CE7D5-CF57-46EF-B807-FDD0502418D4}" type="datetimeFigureOut">
               <a:rPr lang="en-US" smtClean="0"/>
-              <a:t>2/8/2021</a:t>
+              <a:t>2/9/2021</a:t>
             </a:fld>
             <a:endParaRPr lang="en-US"/>
           </a:p>
@@ -1260,7 +1262,7 @@
           <a:p>
             <a:fld id="{846CE7D5-CF57-46EF-B807-FDD0502418D4}" type="datetimeFigureOut">
               <a:rPr lang="en-US" smtClean="0"/>
-              <a:t>2/8/2021</a:t>
+              <a:t>2/9/2021</a:t>
             </a:fld>
             <a:endParaRPr lang="en-US"/>
           </a:p>
@@ -1627,7 +1629,7 @@
           <a:p>
             <a:fld id="{846CE7D5-CF57-46EF-B807-FDD0502418D4}" type="datetimeFigureOut">
               <a:rPr lang="en-US" smtClean="0"/>
-              <a:t>2/8/2021</a:t>
+              <a:t>2/9/2021</a:t>
             </a:fld>
             <a:endParaRPr lang="en-US"/>
           </a:p>
@@ -1745,7 +1747,7 @@
           <a:p>
             <a:fld id="{846CE7D5-CF57-46EF-B807-FDD0502418D4}" type="datetimeFigureOut">
               <a:rPr lang="en-US" smtClean="0"/>
-              <a:t>2/8/2021</a:t>
+              <a:t>2/9/2021</a:t>
             </a:fld>
             <a:endParaRPr lang="en-US"/>
           </a:p>
@@ -1840,7 +1842,7 @@
           <a:p>
             <a:fld id="{846CE7D5-CF57-46EF-B807-FDD0502418D4}" type="datetimeFigureOut">
               <a:rPr lang="en-US" smtClean="0"/>
-              <a:t>2/8/2021</a:t>
+              <a:t>2/9/2021</a:t>
             </a:fld>
             <a:endParaRPr lang="en-US"/>
           </a:p>
@@ -2117,7 +2119,7 @@
           <a:p>
             <a:fld id="{846CE7D5-CF57-46EF-B807-FDD0502418D4}" type="datetimeFigureOut">
               <a:rPr lang="en-US" smtClean="0"/>
-              <a:t>2/8/2021</a:t>
+              <a:t>2/9/2021</a:t>
             </a:fld>
             <a:endParaRPr lang="en-US"/>
           </a:p>
@@ -2374,7 +2376,7 @@
           <a:p>
             <a:fld id="{846CE7D5-CF57-46EF-B807-FDD0502418D4}" type="datetimeFigureOut">
               <a:rPr lang="en-US" smtClean="0"/>
-              <a:t>2/8/2021</a:t>
+              <a:t>2/9/2021</a:t>
             </a:fld>
             <a:endParaRPr lang="en-US"/>
           </a:p>
@@ -2587,7 +2589,7 @@
           <a:p>
             <a:fld id="{846CE7D5-CF57-46EF-B807-FDD0502418D4}" type="datetimeFigureOut">
               <a:rPr lang="en-US" smtClean="0"/>
-              <a:t>2/8/2021</a:t>
+              <a:t>2/9/2021</a:t>
             </a:fld>
             <a:endParaRPr lang="en-US"/>
           </a:p>
@@ -3033,6 +3035,276 @@
     <p:extLst>
       <p:ext uri="{BB962C8B-B14F-4D97-AF65-F5344CB8AC3E}">
         <p14:creationId xmlns:p14="http://schemas.microsoft.com/office/powerpoint/2010/main" val="109857222"/>
+      </p:ext>
+    </p:extLst>
+  </p:cSld>
+  <p:clrMapOvr>
+    <a:masterClrMapping/>
+  </p:clrMapOvr>
+</p:sld>
+</file>
+
+<file path=ppt/slides/slide10.xml><?xml version="1.0" encoding="utf-8"?>
+<p:sld xmlns:a="http://schemas.openxmlformats.org/drawingml/2006/main" xmlns:r="http://schemas.openxmlformats.org/officeDocument/2006/relationships" xmlns:p="http://schemas.openxmlformats.org/presentationml/2006/main">
+  <p:cSld>
+    <p:spTree>
+      <p:nvGrpSpPr>
+        <p:cNvPr id="1" name=""/>
+        <p:cNvGrpSpPr/>
+        <p:nvPr/>
+      </p:nvGrpSpPr>
+      <p:grpSpPr>
+        <a:xfrm>
+          <a:off x="0" y="0"/>
+          <a:ext cx="0" cy="0"/>
+          <a:chOff x="0" y="0"/>
+          <a:chExt cx="0" cy="0"/>
+        </a:xfrm>
+      </p:grpSpPr>
+      <p:sp>
+        <p:nvSpPr>
+          <p:cNvPr id="2" name="Title 1">
+            <a:extLst>
+              <a:ext uri="{FF2B5EF4-FFF2-40B4-BE49-F238E27FC236}">
+                <a16:creationId xmlns:a16="http://schemas.microsoft.com/office/drawing/2014/main" id="{43417F06-A5F6-4000-87C4-320431295B27}"/>
+              </a:ext>
+            </a:extLst>
+          </p:cNvPr>
+          <p:cNvSpPr>
+            <a:spLocks noGrp="1"/>
+          </p:cNvSpPr>
+          <p:nvPr>
+            <p:ph type="title"/>
+          </p:nvPr>
+        </p:nvSpPr>
+        <p:spPr>
+          <a:xfrm>
+            <a:off x="128262" y="171075"/>
+            <a:ext cx="10515600" cy="909067"/>
+          </a:xfrm>
+        </p:spPr>
+        <p:txBody>
+          <a:bodyPr/>
+          <a:lstStyle/>
+          <a:p>
+            <a:r>
+              <a:rPr lang="en-US" dirty="0">
+                <a:cs typeface="Calibri Light"/>
+              </a:rPr>
+              <a:t>Operational Details</a:t>
+            </a:r>
+          </a:p>
+        </p:txBody>
+      </p:sp>
+      <p:sp>
+        <p:nvSpPr>
+          <p:cNvPr id="3" name="Content Placeholder 2">
+            <a:extLst>
+              <a:ext uri="{FF2B5EF4-FFF2-40B4-BE49-F238E27FC236}">
+                <a16:creationId xmlns:a16="http://schemas.microsoft.com/office/drawing/2014/main" id="{5F5606AC-223E-430D-B9B6-10F899EEF4BC}"/>
+              </a:ext>
+            </a:extLst>
+          </p:cNvPr>
+          <p:cNvSpPr>
+            <a:spLocks noGrp="1"/>
+          </p:cNvSpPr>
+          <p:nvPr>
+            <p:ph idx="1"/>
+          </p:nvPr>
+        </p:nvSpPr>
+        <p:spPr>
+          <a:xfrm>
+            <a:off x="260784" y="1011563"/>
+            <a:ext cx="10515600" cy="5383114"/>
+          </a:xfrm>
+        </p:spPr>
+        <p:txBody>
+          <a:bodyPr vert="horz" lIns="91440" tIns="45720" rIns="91440" bIns="45720" rtlCol="0" anchor="t">
+            <a:normAutofit fontScale="85000" lnSpcReduction="20000"/>
+          </a:bodyPr>
+          <a:lstStyle/>
+          <a:p>
+            <a:r>
+              <a:rPr lang="en-US" dirty="0">
+                <a:cs typeface="Calibri"/>
+              </a:rPr>
+              <a:t>How to achieve Non Functional requirements</a:t>
+            </a:r>
+          </a:p>
+          <a:p>
+            <a:r>
+              <a:rPr lang="en-US" dirty="0">
+                <a:cs typeface="Calibri"/>
+              </a:rPr>
+              <a:t>High response time</a:t>
+            </a:r>
+          </a:p>
+          <a:p>
+            <a:pPr lvl="1"/>
+            <a:r>
+              <a:rPr lang="en-US" dirty="0">
+                <a:cs typeface="Calibri"/>
+              </a:rPr>
+              <a:t>Using Kinesis gives us ability to process thousands of records per </a:t>
+            </a:r>
+            <a:r>
+              <a:rPr lang="en-US" dirty="0" err="1">
+                <a:cs typeface="Calibri"/>
+              </a:rPr>
+              <a:t>Shard</a:t>
+            </a:r>
+            <a:r>
+              <a:rPr lang="en-US" dirty="0">
+                <a:cs typeface="Calibri"/>
+              </a:rPr>
+              <a:t>.</a:t>
+            </a:r>
+          </a:p>
+          <a:p>
+            <a:pPr lvl="1"/>
+            <a:r>
+              <a:rPr lang="en-US" dirty="0">
+                <a:cs typeface="Calibri"/>
+              </a:rPr>
+              <a:t>Lamda is auto scaled and can support processing speed of Kinesis same goes for SNS service.</a:t>
+            </a:r>
+          </a:p>
+          <a:p>
+            <a:pPr lvl="1"/>
+            <a:r>
+              <a:rPr lang="en-US" dirty="0">
+                <a:cs typeface="Calibri"/>
+              </a:rPr>
+              <a:t>Redis cluster provides high throughput cache.</a:t>
+            </a:r>
+          </a:p>
+          <a:p>
+            <a:r>
+              <a:rPr lang="en-US" dirty="0">
+                <a:cs typeface="Calibri"/>
+              </a:rPr>
+              <a:t>High Availability</a:t>
+            </a:r>
+          </a:p>
+          <a:p>
+            <a:pPr lvl="1"/>
+            <a:r>
+              <a:rPr lang="en-US" dirty="0">
+                <a:cs typeface="Calibri"/>
+              </a:rPr>
+              <a:t>As the system overview depicts we have Elastic load balancer in place. </a:t>
+            </a:r>
+            <a:br>
+              <a:rPr lang="en-US" dirty="0">
+                <a:cs typeface="Calibri"/>
+              </a:rPr>
+            </a:br>
+            <a:r>
+              <a:rPr lang="en-US" dirty="0">
+                <a:cs typeface="Calibri"/>
+              </a:rPr>
+              <a:t>We are going to spawn multiple datacenters in different availability zones with cross region replication.</a:t>
+            </a:r>
+          </a:p>
+          <a:p>
+            <a:pPr lvl="1"/>
+            <a:r>
+              <a:rPr lang="en-US" dirty="0">
+                <a:cs typeface="Calibri"/>
+              </a:rPr>
+              <a:t>Replication of both Kinesis data streams and Redis cache.</a:t>
+            </a:r>
+          </a:p>
+          <a:p>
+            <a:pPr lvl="1"/>
+            <a:r>
+              <a:rPr lang="en-US" dirty="0">
+                <a:cs typeface="Calibri"/>
+              </a:rPr>
+              <a:t>Dynamo DB / RDS are highly available and scalable databases.</a:t>
+            </a:r>
+          </a:p>
+          <a:p>
+            <a:r>
+              <a:rPr lang="en-US" dirty="0">
+                <a:cs typeface="Calibri"/>
+              </a:rPr>
+              <a:t>Security</a:t>
+            </a:r>
+          </a:p>
+          <a:p>
+            <a:pPr lvl="1"/>
+            <a:r>
+              <a:rPr lang="en-US" dirty="0">
+                <a:cs typeface="Calibri"/>
+              </a:rPr>
+              <a:t>VPC secures all the internal communication.</a:t>
+            </a:r>
+          </a:p>
+          <a:p>
+            <a:pPr lvl="1"/>
+            <a:r>
+              <a:rPr lang="en-US" dirty="0">
+                <a:cs typeface="Calibri"/>
+              </a:rPr>
+              <a:t>For the user to set Rules uses the API Token which is provided and set in user's device at the time of user registration and logging in to application.</a:t>
+            </a:r>
+          </a:p>
+          <a:p>
+            <a:pPr lvl="1"/>
+            <a:r>
+              <a:rPr lang="en-US" dirty="0">
+                <a:cs typeface="Calibri"/>
+              </a:rPr>
+              <a:t>**</a:t>
+            </a:r>
+            <a:r>
+              <a:rPr lang="en-US" dirty="0">
+                <a:ea typeface="+mn-lt"/>
+                <a:cs typeface="+mn-lt"/>
+              </a:rPr>
+              <a:t> There are many Vehicular cloud computing solutions which provide secure communication between vehicle and server** </a:t>
+            </a:r>
+            <a:endParaRPr lang="en-US"/>
+          </a:p>
+          <a:p>
+            <a:pPr lvl="1"/>
+            <a:endParaRPr lang="en-US" dirty="0">
+              <a:cs typeface="Calibri"/>
+            </a:endParaRPr>
+          </a:p>
+          <a:p>
+            <a:pPr lvl="1"/>
+            <a:endParaRPr lang="en-US" dirty="0">
+              <a:cs typeface="Calibri"/>
+            </a:endParaRPr>
+          </a:p>
+          <a:p>
+            <a:pPr lvl="1"/>
+            <a:endParaRPr lang="en-US" dirty="0">
+              <a:cs typeface="Calibri"/>
+            </a:endParaRPr>
+          </a:p>
+          <a:p>
+            <a:pPr marL="457200" lvl="1" indent="0">
+              <a:buNone/>
+            </a:pPr>
+            <a:endParaRPr lang="en-US" dirty="0">
+              <a:cs typeface="Calibri"/>
+            </a:endParaRPr>
+          </a:p>
+          <a:p>
+            <a:pPr lvl="1"/>
+            <a:endParaRPr lang="en-US" dirty="0">
+              <a:cs typeface="Calibri"/>
+            </a:endParaRPr>
+          </a:p>
+        </p:txBody>
+      </p:sp>
+    </p:spTree>
+    <p:extLst>
+      <p:ext uri="{BB962C8B-B14F-4D97-AF65-F5344CB8AC3E}">
+        <p14:creationId xmlns:p14="http://schemas.microsoft.com/office/powerpoint/2010/main" val="1139416658"/>
       </p:ext>
     </p:extLst>
   </p:cSld>

</xml_diff>

<commit_message>
Updated a few more sections
</commit_message>
<xml_diff>
--- a/Presentation RMCH Unit.pptx
+++ b/Presentation RMCH Unit.pptx
@@ -14,7 +14,11 @@
     <p:sldId id="266" r:id="rId8"/>
     <p:sldId id="262" r:id="rId9"/>
     <p:sldId id="268" r:id="rId10"/>
-    <p:sldId id="269" r:id="rId11"/>
+    <p:sldId id="273" r:id="rId11"/>
+    <p:sldId id="274" r:id="rId12"/>
+    <p:sldId id="271" r:id="rId13"/>
+    <p:sldId id="272" r:id="rId14"/>
+    <p:sldId id="269" r:id="rId15"/>
   </p:sldIdLst>
   <p:sldSz cx="12192000" cy="6858000"/>
   <p:notesSz cx="6858000" cy="9144000"/>
@@ -124,10 +128,13 @@
 <file path=ppt/revisionInfo.xml><?xml version="1.0" encoding="utf-8"?>
 <p1510:revInfo xmlns:a="http://schemas.openxmlformats.org/drawingml/2006/main" xmlns:r="http://schemas.openxmlformats.org/officeDocument/2006/relationships" xmlns:p1510="http://schemas.microsoft.com/office/powerpoint/2015/10/main">
   <p1510:revLst>
-    <p1510:client id="{39B79FE7-C65C-4744-A5F9-1A7D979444EA}" v="2824" dt="2021-02-09T16:28:30.419"/>
+    <p1510:client id="{39B79FE7-C65C-4744-A5F9-1A7D979444EA}" v="3245" dt="2021-02-10T15:31:18.071"/>
     <p1510:client id="{40A3309F-A14A-4255-A73A-00BA0BEEC9D7}" v="157" dt="2021-02-08T19:05:12.679"/>
+    <p1510:client id="{6A92BBDD-4F8C-411B-96AE-C1CF8CA559CE}" v="6209" dt="2021-02-14T14:25:17.625"/>
     <p1510:client id="{74C168C7-3501-4AC4-880A-8F91D094CB35}" v="3724" dt="2021-02-08T19:00:54.966"/>
+    <p1510:client id="{C3969ED4-91CE-4656-947B-F18DDAC7BAEF}" v="2101" dt="2021-02-14T08:05:33.945"/>
     <p1510:client id="{DDA13561-B690-43CC-A3FA-D12BECDC5F54}" v="1108" dt="2021-02-08T04:14:15.006"/>
+    <p1510:client id="{E24C84B7-9606-401A-8E94-6DDBA1C3063B}" v="1247" dt="2021-02-14T16:21:49.595"/>
     <p1510:client id="{FDF636DE-32DF-40B0-A677-96703393C176}" v="2136" dt="2021-02-07T15:45:51.105"/>
   </p1510:revLst>
 </p1510:revInfo>
@@ -264,7 +271,7 @@
           <a:p>
             <a:fld id="{846CE7D5-CF57-46EF-B807-FDD0502418D4}" type="datetimeFigureOut">
               <a:rPr lang="en-US" smtClean="0"/>
-              <a:t>2/9/2021</a:t>
+              <a:t>2/14/2021</a:t>
             </a:fld>
             <a:endParaRPr lang="en-US"/>
           </a:p>
@@ -434,7 +441,7 @@
           <a:p>
             <a:fld id="{846CE7D5-CF57-46EF-B807-FDD0502418D4}" type="datetimeFigureOut">
               <a:rPr lang="en-US" smtClean="0"/>
-              <a:t>2/9/2021</a:t>
+              <a:t>2/14/2021</a:t>
             </a:fld>
             <a:endParaRPr lang="en-US"/>
           </a:p>
@@ -614,7 +621,7 @@
           <a:p>
             <a:fld id="{846CE7D5-CF57-46EF-B807-FDD0502418D4}" type="datetimeFigureOut">
               <a:rPr lang="en-US" smtClean="0"/>
-              <a:t>2/9/2021</a:t>
+              <a:t>2/14/2021</a:t>
             </a:fld>
             <a:endParaRPr lang="en-US"/>
           </a:p>
@@ -784,7 +791,7 @@
           <a:p>
             <a:fld id="{846CE7D5-CF57-46EF-B807-FDD0502418D4}" type="datetimeFigureOut">
               <a:rPr lang="en-US" smtClean="0"/>
-              <a:t>2/9/2021</a:t>
+              <a:t>2/14/2021</a:t>
             </a:fld>
             <a:endParaRPr lang="en-US"/>
           </a:p>
@@ -1030,7 +1037,7 @@
           <a:p>
             <a:fld id="{846CE7D5-CF57-46EF-B807-FDD0502418D4}" type="datetimeFigureOut">
               <a:rPr lang="en-US" smtClean="0"/>
-              <a:t>2/9/2021</a:t>
+              <a:t>2/14/2021</a:t>
             </a:fld>
             <a:endParaRPr lang="en-US"/>
           </a:p>
@@ -1262,7 +1269,7 @@
           <a:p>
             <a:fld id="{846CE7D5-CF57-46EF-B807-FDD0502418D4}" type="datetimeFigureOut">
               <a:rPr lang="en-US" smtClean="0"/>
-              <a:t>2/9/2021</a:t>
+              <a:t>2/14/2021</a:t>
             </a:fld>
             <a:endParaRPr lang="en-US"/>
           </a:p>
@@ -1629,7 +1636,7 @@
           <a:p>
             <a:fld id="{846CE7D5-CF57-46EF-B807-FDD0502418D4}" type="datetimeFigureOut">
               <a:rPr lang="en-US" smtClean="0"/>
-              <a:t>2/9/2021</a:t>
+              <a:t>2/14/2021</a:t>
             </a:fld>
             <a:endParaRPr lang="en-US"/>
           </a:p>
@@ -1747,7 +1754,7 @@
           <a:p>
             <a:fld id="{846CE7D5-CF57-46EF-B807-FDD0502418D4}" type="datetimeFigureOut">
               <a:rPr lang="en-US" smtClean="0"/>
-              <a:t>2/9/2021</a:t>
+              <a:t>2/14/2021</a:t>
             </a:fld>
             <a:endParaRPr lang="en-US"/>
           </a:p>
@@ -1842,7 +1849,7 @@
           <a:p>
             <a:fld id="{846CE7D5-CF57-46EF-B807-FDD0502418D4}" type="datetimeFigureOut">
               <a:rPr lang="en-US" smtClean="0"/>
-              <a:t>2/9/2021</a:t>
+              <a:t>2/14/2021</a:t>
             </a:fld>
             <a:endParaRPr lang="en-US"/>
           </a:p>
@@ -2119,7 +2126,7 @@
           <a:p>
             <a:fld id="{846CE7D5-CF57-46EF-B807-FDD0502418D4}" type="datetimeFigureOut">
               <a:rPr lang="en-US" smtClean="0"/>
-              <a:t>2/9/2021</a:t>
+              <a:t>2/14/2021</a:t>
             </a:fld>
             <a:endParaRPr lang="en-US"/>
           </a:p>
@@ -2376,7 +2383,7 @@
           <a:p>
             <a:fld id="{846CE7D5-CF57-46EF-B807-FDD0502418D4}" type="datetimeFigureOut">
               <a:rPr lang="en-US" smtClean="0"/>
-              <a:t>2/9/2021</a:t>
+              <a:t>2/14/2021</a:t>
             </a:fld>
             <a:endParaRPr lang="en-US"/>
           </a:p>
@@ -2589,7 +2596,7 @@
           <a:p>
             <a:fld id="{846CE7D5-CF57-46EF-B807-FDD0502418D4}" type="datetimeFigureOut">
               <a:rPr lang="en-US" smtClean="0"/>
-              <a:t>2/9/2021</a:t>
+              <a:t>2/14/2021</a:t>
             </a:fld>
             <a:endParaRPr lang="en-US"/>
           </a:p>
@@ -3066,6 +3073,679 @@
           <p:cNvPr id="2" name="Title 1">
             <a:extLst>
               <a:ext uri="{FF2B5EF4-FFF2-40B4-BE49-F238E27FC236}">
+                <a16:creationId xmlns:a16="http://schemas.microsoft.com/office/drawing/2014/main" id="{AA8165C9-6FA9-4E9C-A9DC-3652466ECF59}"/>
+              </a:ext>
+            </a:extLst>
+          </p:cNvPr>
+          <p:cNvSpPr>
+            <a:spLocks noGrp="1"/>
+          </p:cNvSpPr>
+          <p:nvPr>
+            <p:ph type="title"/>
+          </p:nvPr>
+        </p:nvSpPr>
+        <p:spPr>
+          <a:xfrm>
+            <a:off x="473" y="90616"/>
+            <a:ext cx="10515600" cy="757613"/>
+          </a:xfrm>
+        </p:spPr>
+        <p:txBody>
+          <a:bodyPr/>
+          <a:lstStyle/>
+          <a:p>
+            <a:r>
+              <a:rPr lang="en-US">
+                <a:cs typeface="Calibri Light"/>
+              </a:rPr>
+              <a:t>Client side flow</a:t>
+            </a:r>
+            <a:endParaRPr lang="en-US"/>
+          </a:p>
+        </p:txBody>
+      </p:sp>
+      <p:sp>
+        <p:nvSpPr>
+          <p:cNvPr id="3" name="Content Placeholder 2">
+            <a:extLst>
+              <a:ext uri="{FF2B5EF4-FFF2-40B4-BE49-F238E27FC236}">
+                <a16:creationId xmlns:a16="http://schemas.microsoft.com/office/drawing/2014/main" id="{CF197013-4193-436E-B10A-11D0643F4905}"/>
+              </a:ext>
+            </a:extLst>
+          </p:cNvPr>
+          <p:cNvSpPr>
+            <a:spLocks noGrp="1"/>
+          </p:cNvSpPr>
+          <p:nvPr>
+            <p:ph idx="1"/>
+          </p:nvPr>
+        </p:nvSpPr>
+        <p:spPr>
+          <a:xfrm>
+            <a:off x="80933" y="812780"/>
+            <a:ext cx="10515600" cy="5723884"/>
+          </a:xfrm>
+        </p:spPr>
+        <p:txBody>
+          <a:bodyPr vert="horz" lIns="91440" tIns="45720" rIns="91440" bIns="45720" rtlCol="0" anchor="t">
+            <a:normAutofit fontScale="92500"/>
+          </a:bodyPr>
+          <a:lstStyle/>
+          <a:p>
+            <a:r>
+              <a:rPr lang="en-US" dirty="0">
+                <a:cs typeface="Calibri"/>
+              </a:rPr>
+              <a:t>Setting Rule</a:t>
+            </a:r>
+          </a:p>
+          <a:p>
+            <a:pPr lvl="1"/>
+            <a:r>
+              <a:rPr lang="en-US" dirty="0">
+                <a:cs typeface="Calibri"/>
+              </a:rPr>
+              <a:t>User logs in to the application.</a:t>
+            </a:r>
+          </a:p>
+          <a:p>
+            <a:pPr lvl="1"/>
+            <a:r>
+              <a:rPr lang="en-US" dirty="0">
+                <a:cs typeface="Calibri"/>
+              </a:rPr>
+              <a:t>A new option in the form of button / link will be shown to the user to click and set parental control rules.</a:t>
+            </a:r>
+          </a:p>
+          <a:p>
+            <a:pPr lvl="1"/>
+            <a:r>
+              <a:rPr lang="en-US" dirty="0">
+                <a:cs typeface="Calibri"/>
+              </a:rPr>
+              <a:t>Clicking on the option the application will open a new page / tab / accordion to set all the parental control rules.</a:t>
+            </a:r>
+          </a:p>
+          <a:p>
+            <a:pPr lvl="1"/>
+            <a:r>
+              <a:rPr lang="en-US" dirty="0">
+                <a:cs typeface="Calibri"/>
+              </a:rPr>
+              <a:t>The user can give any name for the rule and then set the conditions for notifications.</a:t>
+            </a:r>
+          </a:p>
+          <a:p>
+            <a:pPr lvl="1"/>
+            <a:r>
+              <a:rPr lang="en-US" dirty="0">
+                <a:cs typeface="Calibri"/>
+              </a:rPr>
+              <a:t>Once the rule is created the user can apply the same on any pre-registered vehicles.</a:t>
+            </a:r>
+          </a:p>
+          <a:p>
+            <a:pPr lvl="1"/>
+            <a:r>
+              <a:rPr lang="en-US" dirty="0">
+                <a:cs typeface="Calibri"/>
+              </a:rPr>
+              <a:t>The user will also have an option to switch on / off the rule for any particular vehicle.</a:t>
+            </a:r>
+            <a:endParaRPr lang="en-US" dirty="0">
+              <a:ea typeface="+mn-lt"/>
+              <a:cs typeface="+mn-lt"/>
+            </a:endParaRPr>
+          </a:p>
+          <a:p>
+            <a:pPr lvl="1"/>
+            <a:r>
+              <a:rPr lang="en-US" dirty="0">
+                <a:ea typeface="+mn-lt"/>
+                <a:cs typeface="+mn-lt"/>
+              </a:rPr>
+              <a:t>The application will mandate the user to set at-least 2 recipients considering the severity of the rule.</a:t>
+            </a:r>
+            <a:endParaRPr lang="en-US" dirty="0"/>
+          </a:p>
+          <a:p>
+            <a:pPr marL="971550" lvl="1" indent="-285750">
+              <a:buFont typeface="Arial"/>
+              <a:buChar char="•"/>
+            </a:pPr>
+            <a:r>
+              <a:rPr lang="en-US" dirty="0">
+                <a:ea typeface="+mn-lt"/>
+                <a:cs typeface="+mn-lt"/>
+              </a:rPr>
+              <a:t>If the User is selecting the rule as normal severity then application may ask for at-least 2 recipients.</a:t>
+            </a:r>
+          </a:p>
+          <a:p>
+            <a:pPr marL="971550" lvl="1" indent="-285750">
+              <a:buFont typeface="Arial"/>
+              <a:buChar char="•"/>
+            </a:pPr>
+            <a:r>
+              <a:rPr lang="en-US" dirty="0">
+                <a:ea typeface="+mn-lt"/>
+                <a:cs typeface="+mn-lt"/>
+              </a:rPr>
+              <a:t>If the Rule is set to high on severity then the application may ask for at-least 3 recipients and more than one mode of notification, Ex:- Txt msg, Mail, WhatsApp, Call, etc.</a:t>
+            </a:r>
+          </a:p>
+          <a:p>
+            <a:endParaRPr lang="en-US" dirty="0">
+              <a:cs typeface="Calibri"/>
+            </a:endParaRPr>
+          </a:p>
+          <a:p>
+            <a:pPr lvl="1"/>
+            <a:endParaRPr lang="en-US" dirty="0">
+              <a:cs typeface="Calibri"/>
+            </a:endParaRPr>
+          </a:p>
+          <a:p>
+            <a:endParaRPr lang="en-US" dirty="0">
+              <a:cs typeface="Calibri"/>
+            </a:endParaRPr>
+          </a:p>
+          <a:p>
+            <a:endParaRPr lang="en-US" dirty="0">
+              <a:cs typeface="Calibri"/>
+            </a:endParaRPr>
+          </a:p>
+        </p:txBody>
+      </p:sp>
+    </p:spTree>
+    <p:extLst>
+      <p:ext uri="{BB962C8B-B14F-4D97-AF65-F5344CB8AC3E}">
+        <p14:creationId xmlns:p14="http://schemas.microsoft.com/office/powerpoint/2010/main" val="1486569236"/>
+      </p:ext>
+    </p:extLst>
+  </p:cSld>
+  <p:clrMapOvr>
+    <a:masterClrMapping/>
+  </p:clrMapOvr>
+</p:sld>
+</file>
+
+<file path=ppt/slides/slide11.xml><?xml version="1.0" encoding="utf-8"?>
+<p:sld xmlns:a="http://schemas.openxmlformats.org/drawingml/2006/main" xmlns:r="http://schemas.openxmlformats.org/officeDocument/2006/relationships" xmlns:p="http://schemas.openxmlformats.org/presentationml/2006/main">
+  <p:cSld>
+    <p:spTree>
+      <p:nvGrpSpPr>
+        <p:cNvPr id="1" name=""/>
+        <p:cNvGrpSpPr/>
+        <p:nvPr/>
+      </p:nvGrpSpPr>
+      <p:grpSpPr>
+        <a:xfrm>
+          <a:off x="0" y="0"/>
+          <a:ext cx="0" cy="0"/>
+          <a:chOff x="0" y="0"/>
+          <a:chExt cx="0" cy="0"/>
+        </a:xfrm>
+      </p:grpSpPr>
+      <p:sp>
+        <p:nvSpPr>
+          <p:cNvPr id="2" name="Title 1">
+            <a:extLst>
+              <a:ext uri="{FF2B5EF4-FFF2-40B4-BE49-F238E27FC236}">
+                <a16:creationId xmlns:a16="http://schemas.microsoft.com/office/drawing/2014/main" id="{619AE21C-B0EC-4040-8E32-0B71126C05C9}"/>
+              </a:ext>
+            </a:extLst>
+          </p:cNvPr>
+          <p:cNvSpPr>
+            <a:spLocks noGrp="1"/>
+          </p:cNvSpPr>
+          <p:nvPr>
+            <p:ph type="title"/>
+          </p:nvPr>
+        </p:nvSpPr>
+        <p:spPr>
+          <a:xfrm>
+            <a:off x="43070" y="62218"/>
+            <a:ext cx="10515600" cy="483104"/>
+          </a:xfrm>
+        </p:spPr>
+        <p:txBody>
+          <a:bodyPr>
+            <a:normAutofit fontScale="90000"/>
+          </a:bodyPr>
+          <a:lstStyle/>
+          <a:p>
+            <a:r>
+              <a:rPr lang="en-US">
+                <a:ea typeface="+mj-lt"/>
+                <a:cs typeface="+mj-lt"/>
+              </a:rPr>
+              <a:t>Client side flow</a:t>
+            </a:r>
+            <a:endParaRPr lang="en-US"/>
+          </a:p>
+        </p:txBody>
+      </p:sp>
+      <p:sp>
+        <p:nvSpPr>
+          <p:cNvPr id="3" name="Content Placeholder 2">
+            <a:extLst>
+              <a:ext uri="{FF2B5EF4-FFF2-40B4-BE49-F238E27FC236}">
+                <a16:creationId xmlns:a16="http://schemas.microsoft.com/office/drawing/2014/main" id="{21A2660E-EC37-49A3-9A15-A434DADCAC8F}"/>
+              </a:ext>
+            </a:extLst>
+          </p:cNvPr>
+          <p:cNvSpPr>
+            <a:spLocks noGrp="1"/>
+          </p:cNvSpPr>
+          <p:nvPr>
+            <p:ph idx="1"/>
+          </p:nvPr>
+        </p:nvSpPr>
+        <p:spPr>
+          <a:xfrm>
+            <a:off x="99865" y="623464"/>
+            <a:ext cx="10875301" cy="5979462"/>
+          </a:xfrm>
+        </p:spPr>
+        <p:txBody>
+          <a:bodyPr vert="horz" lIns="91440" tIns="45720" rIns="91440" bIns="45720" rtlCol="0" anchor="t">
+            <a:normAutofit fontScale="92500" lnSpcReduction="10000"/>
+          </a:bodyPr>
+          <a:lstStyle/>
+          <a:p>
+            <a:r>
+              <a:rPr lang="en-US" dirty="0">
+                <a:ea typeface="+mn-lt"/>
+                <a:cs typeface="+mn-lt"/>
+              </a:rPr>
+              <a:t>How the Application work</a:t>
+            </a:r>
+          </a:p>
+          <a:p>
+            <a:pPr lvl="1" indent="-285750"/>
+            <a:r>
+              <a:rPr lang="en-US" sz="1800" dirty="0">
+                <a:ea typeface="+mn-lt"/>
+                <a:cs typeface="+mn-lt"/>
+              </a:rPr>
+              <a:t>If the car is started the user would get a pop-up in the form of push notification in the app / text message.</a:t>
+            </a:r>
+          </a:p>
+          <a:p>
+            <a:pPr lvl="1" indent="-285750"/>
+            <a:r>
+              <a:rPr lang="en-US" sz="1800" dirty="0">
+                <a:ea typeface="+mn-lt"/>
+                <a:cs typeface="+mn-lt"/>
+              </a:rPr>
+              <a:t>If the car is driven out side of the specified location then the user will get a pop-up / text notification with a message tone / vibration of the phone so that this can draw users attention to take action.</a:t>
+            </a:r>
+          </a:p>
+          <a:p>
+            <a:pPr lvl="1" indent="-285750"/>
+            <a:r>
+              <a:rPr lang="en-US" sz="1800" dirty="0">
+                <a:ea typeface="+mn-lt"/>
+                <a:cs typeface="+mn-lt"/>
+              </a:rPr>
+              <a:t>After every specified duration the user will keep getting pop-up messages.</a:t>
+            </a:r>
+          </a:p>
+          <a:p>
+            <a:pPr lvl="1" indent="-285750"/>
+            <a:r>
+              <a:rPr lang="en-US" sz="1800" dirty="0">
+                <a:ea typeface="+mn-lt"/>
+                <a:cs typeface="+mn-lt"/>
+              </a:rPr>
+              <a:t>If the user is not responding then the pop-up message / txt message will be sent to other recipients mentioned in the escalation list. It might happen that the other recipients have not installed this app, so the message will be sent as text message / pop-up message.</a:t>
+            </a:r>
+          </a:p>
+          <a:p>
+            <a:pPr lvl="1" indent="-285750"/>
+            <a:r>
+              <a:rPr lang="en-US" sz="1800" dirty="0">
+                <a:ea typeface="+mn-lt"/>
+                <a:cs typeface="+mn-lt"/>
+              </a:rPr>
+              <a:t>The Notification can only be stopped by the user, this is in consideration with the security. User is the best judge of the situation and the decision should only be taken by the one who has set the Rule whether it is OK to stop the notification or not.</a:t>
+            </a:r>
+          </a:p>
+          <a:p>
+            <a:pPr lvl="1" indent="-285750"/>
+            <a:r>
+              <a:rPr lang="en-US" sz="1800" dirty="0">
+                <a:ea typeface="+mn-lt"/>
+                <a:cs typeface="+mn-lt"/>
+              </a:rPr>
+              <a:t>The user should now use the app / resisted mail id to send a stop notification code which will be generated by the application as an OTP. The one time password would be sent to the user at that point of time to either registered mail-id / registered phone / both.</a:t>
+            </a:r>
+          </a:p>
+          <a:p>
+            <a:r>
+              <a:rPr lang="en-US" dirty="0">
+                <a:ea typeface="+mn-lt"/>
+                <a:cs typeface="+mn-lt"/>
+              </a:rPr>
+              <a:t>Exception</a:t>
+            </a:r>
+            <a:endParaRPr lang="en-US" dirty="0"/>
+          </a:p>
+          <a:p>
+            <a:pPr lvl="1"/>
+            <a:r>
+              <a:rPr lang="en-US" sz="1800" dirty="0">
+                <a:ea typeface="+mn-lt"/>
+                <a:cs typeface="+mn-lt"/>
+              </a:rPr>
+              <a:t>The user will get a message every time the car is started, so if the car is started 5 times in 1 mins then the user will get 5 messages. If the car is being halted for 'N' number of times over the journey then for every start the user will get message ?</a:t>
+            </a:r>
+          </a:p>
+          <a:p>
+            <a:pPr lvl="1"/>
+            <a:r>
+              <a:rPr lang="en-US" sz="1800" dirty="0">
+                <a:ea typeface="+mn-lt"/>
+                <a:cs typeface="+mn-lt"/>
+              </a:rPr>
+              <a:t>If the car is driven out of the specified location / area and then immediately brought back to the location boundary then also the notification service will keep sending the notification messages till it is stopped by user / owner.</a:t>
+            </a:r>
+          </a:p>
+          <a:p>
+            <a:pPr lvl="1"/>
+            <a:r>
+              <a:rPr lang="en-US" sz="1800" dirty="0">
+                <a:cs typeface="Calibri"/>
+              </a:rPr>
+              <a:t>If the User doesn't have access to Phone / Mail then user can call-up CSR / help line to stop the notification by answering a few PII questions.</a:t>
+            </a:r>
+          </a:p>
+        </p:txBody>
+      </p:sp>
+    </p:spTree>
+    <p:extLst>
+      <p:ext uri="{BB962C8B-B14F-4D97-AF65-F5344CB8AC3E}">
+        <p14:creationId xmlns:p14="http://schemas.microsoft.com/office/powerpoint/2010/main" val="4043942750"/>
+      </p:ext>
+    </p:extLst>
+  </p:cSld>
+  <p:clrMapOvr>
+    <a:masterClrMapping/>
+  </p:clrMapOvr>
+</p:sld>
+</file>
+
+<file path=ppt/slides/slide12.xml><?xml version="1.0" encoding="utf-8"?>
+<p:sld xmlns:a="http://schemas.openxmlformats.org/drawingml/2006/main" xmlns:r="http://schemas.openxmlformats.org/officeDocument/2006/relationships" xmlns:p="http://schemas.openxmlformats.org/presentationml/2006/main">
+  <p:cSld>
+    <p:spTree>
+      <p:nvGrpSpPr>
+        <p:cNvPr id="1" name=""/>
+        <p:cNvGrpSpPr/>
+        <p:nvPr/>
+      </p:nvGrpSpPr>
+      <p:grpSpPr>
+        <a:xfrm>
+          <a:off x="0" y="0"/>
+          <a:ext cx="0" cy="0"/>
+          <a:chOff x="0" y="0"/>
+          <a:chExt cx="0" cy="0"/>
+        </a:xfrm>
+      </p:grpSpPr>
+      <p:sp>
+        <p:nvSpPr>
+          <p:cNvPr id="2" name="Title 1">
+            <a:extLst>
+              <a:ext uri="{FF2B5EF4-FFF2-40B4-BE49-F238E27FC236}">
+                <a16:creationId xmlns:a16="http://schemas.microsoft.com/office/drawing/2014/main" id="{74AB70E6-FE47-4D4B-AA09-25DD339DAB7E}"/>
+              </a:ext>
+            </a:extLst>
+          </p:cNvPr>
+          <p:cNvSpPr>
+            <a:spLocks noGrp="1"/>
+          </p:cNvSpPr>
+          <p:nvPr>
+            <p:ph type="title"/>
+          </p:nvPr>
+        </p:nvSpPr>
+        <p:spPr>
+          <a:xfrm>
+            <a:off x="142683" y="109421"/>
+            <a:ext cx="11211117" cy="906207"/>
+          </a:xfrm>
+        </p:spPr>
+        <p:txBody>
+          <a:bodyPr/>
+          <a:lstStyle/>
+          <a:p>
+            <a:r>
+              <a:rPr lang="en-US">
+                <a:cs typeface="Calibri Light"/>
+              </a:rPr>
+              <a:t>Network Security</a:t>
+            </a:r>
+            <a:endParaRPr lang="en-US"/>
+          </a:p>
+        </p:txBody>
+      </p:sp>
+      <p:sp>
+        <p:nvSpPr>
+          <p:cNvPr id="6" name="Content Placeholder 5">
+            <a:extLst>
+              <a:ext uri="{FF2B5EF4-FFF2-40B4-BE49-F238E27FC236}">
+                <a16:creationId xmlns:a16="http://schemas.microsoft.com/office/drawing/2014/main" id="{8A38C6FA-5965-4C4D-8467-DD05D8D349B1}"/>
+              </a:ext>
+            </a:extLst>
+          </p:cNvPr>
+          <p:cNvSpPr>
+            <a:spLocks noGrp="1"/>
+          </p:cNvSpPr>
+          <p:nvPr>
+            <p:ph idx="1"/>
+          </p:nvPr>
+        </p:nvSpPr>
+        <p:spPr>
+          <a:xfrm>
+            <a:off x="101771" y="1012485"/>
+            <a:ext cx="11252029" cy="5164478"/>
+          </a:xfrm>
+        </p:spPr>
+        <p:txBody>
+          <a:bodyPr vert="horz" lIns="91440" tIns="45720" rIns="91440" bIns="45720" rtlCol="0" anchor="t">
+            <a:normAutofit/>
+          </a:bodyPr>
+          <a:lstStyle/>
+          <a:p>
+            <a:r>
+              <a:rPr lang="en-US" dirty="0">
+                <a:cs typeface="Calibri"/>
+              </a:rPr>
+              <a:t>Security would be implemented in various places over the network flow</a:t>
+            </a:r>
+          </a:p>
+          <a:p>
+            <a:r>
+              <a:rPr lang="en-US" dirty="0">
+                <a:cs typeface="Calibri"/>
+              </a:rPr>
+              <a:t>Load balancer would be configured to listen to port 443 (Cert file will be deployed here)</a:t>
+            </a:r>
+          </a:p>
+          <a:p>
+            <a:r>
+              <a:rPr lang="en-US" dirty="0">
+                <a:cs typeface="Calibri"/>
+              </a:rPr>
+              <a:t>EC2 instances would be created under various security group to only white list the traffic from load balancer.</a:t>
+            </a:r>
+          </a:p>
+          <a:p>
+            <a:r>
+              <a:rPr lang="en-US" dirty="0">
+                <a:cs typeface="Calibri"/>
+              </a:rPr>
+              <a:t>EC2 instances will not have any public IPs the only point of interaction to out-side world would be the LB.</a:t>
+            </a:r>
+          </a:p>
+          <a:p>
+            <a:r>
+              <a:rPr lang="en-US" dirty="0">
+                <a:cs typeface="Calibri"/>
+              </a:rPr>
+              <a:t>In-order to login to EC2 instances we would have Boston Host (Jump server) created opening port 22.</a:t>
+            </a:r>
+          </a:p>
+          <a:p>
+            <a:r>
+              <a:rPr lang="en-US" dirty="0">
+                <a:cs typeface="Calibri"/>
+              </a:rPr>
+              <a:t>The same Boston Host will be used to login to DB server as well.</a:t>
+            </a:r>
+          </a:p>
+          <a:p>
+            <a:r>
+              <a:rPr lang="en-US" dirty="0">
+                <a:cs typeface="Calibri"/>
+              </a:rPr>
+              <a:t>Cert file will be created from IAM / ACM tool.</a:t>
+            </a:r>
+          </a:p>
+        </p:txBody>
+      </p:sp>
+    </p:spTree>
+    <p:extLst>
+      <p:ext uri="{BB962C8B-B14F-4D97-AF65-F5344CB8AC3E}">
+        <p14:creationId xmlns:p14="http://schemas.microsoft.com/office/powerpoint/2010/main" val="4252908425"/>
+      </p:ext>
+    </p:extLst>
+  </p:cSld>
+  <p:clrMapOvr>
+    <a:masterClrMapping/>
+  </p:clrMapOvr>
+</p:sld>
+</file>
+
+<file path=ppt/slides/slide13.xml><?xml version="1.0" encoding="utf-8"?>
+<p:sld xmlns:a="http://schemas.openxmlformats.org/drawingml/2006/main" xmlns:r="http://schemas.openxmlformats.org/officeDocument/2006/relationships" xmlns:p="http://schemas.openxmlformats.org/presentationml/2006/main">
+  <p:cSld>
+    <p:spTree>
+      <p:nvGrpSpPr>
+        <p:cNvPr id="1" name=""/>
+        <p:cNvGrpSpPr/>
+        <p:nvPr/>
+      </p:nvGrpSpPr>
+      <p:grpSpPr>
+        <a:xfrm>
+          <a:off x="0" y="0"/>
+          <a:ext cx="0" cy="0"/>
+          <a:chOff x="0" y="0"/>
+          <a:chExt cx="0" cy="0"/>
+        </a:xfrm>
+      </p:grpSpPr>
+      <p:sp>
+        <p:nvSpPr>
+          <p:cNvPr id="2" name="Title 1">
+            <a:extLst>
+              <a:ext uri="{FF2B5EF4-FFF2-40B4-BE49-F238E27FC236}">
+                <a16:creationId xmlns:a16="http://schemas.microsoft.com/office/drawing/2014/main" id="{1B8C1867-4974-4BF0-ADB6-ABB84204FED7}"/>
+              </a:ext>
+            </a:extLst>
+          </p:cNvPr>
+          <p:cNvSpPr>
+            <a:spLocks noGrp="1"/>
+          </p:cNvSpPr>
+          <p:nvPr>
+            <p:ph type="title"/>
+          </p:nvPr>
+        </p:nvSpPr>
+        <p:spPr>
+          <a:xfrm>
+            <a:off x="60858" y="48052"/>
+            <a:ext cx="11292942" cy="660730"/>
+          </a:xfrm>
+        </p:spPr>
+        <p:txBody>
+          <a:bodyPr>
+            <a:normAutofit fontScale="90000"/>
+          </a:bodyPr>
+          <a:lstStyle/>
+          <a:p>
+            <a:r>
+              <a:rPr lang="en-US">
+                <a:cs typeface="Calibri Light"/>
+              </a:rPr>
+              <a:t>Security Implementation over network</a:t>
+            </a:r>
+            <a:endParaRPr lang="en-US"/>
+          </a:p>
+        </p:txBody>
+      </p:sp>
+      <p:pic>
+        <p:nvPicPr>
+          <p:cNvPr id="4" name="Picture 4" descr="Diagram&#10;&#10;Description automatically generated">
+            <a:extLst>
+              <a:ext uri="{FF2B5EF4-FFF2-40B4-BE49-F238E27FC236}">
+                <a16:creationId xmlns:a16="http://schemas.microsoft.com/office/drawing/2014/main" id="{9B1DE4E3-7413-4FA0-A1B2-B6F173E451A8}"/>
+              </a:ext>
+            </a:extLst>
+          </p:cNvPr>
+          <p:cNvPicPr>
+            <a:picLocks noGrp="1" noChangeAspect="1"/>
+          </p:cNvPicPr>
+          <p:nvPr>
+            <p:ph idx="1"/>
+          </p:nvPr>
+        </p:nvPicPr>
+        <p:blipFill>
+          <a:blip r:embed="rId2"/>
+          <a:stretch>
+            <a:fillRect/>
+          </a:stretch>
+        </p:blipFill>
+        <p:spPr>
+          <a:xfrm>
+            <a:off x="205238" y="923704"/>
+            <a:ext cx="11372492" cy="5507122"/>
+          </a:xfrm>
+        </p:spPr>
+      </p:pic>
+    </p:spTree>
+    <p:extLst>
+      <p:ext uri="{BB962C8B-B14F-4D97-AF65-F5344CB8AC3E}">
+        <p14:creationId xmlns:p14="http://schemas.microsoft.com/office/powerpoint/2010/main" val="3178098854"/>
+      </p:ext>
+    </p:extLst>
+  </p:cSld>
+  <p:clrMapOvr>
+    <a:masterClrMapping/>
+  </p:clrMapOvr>
+</p:sld>
+</file>
+
+<file path=ppt/slides/slide14.xml><?xml version="1.0" encoding="utf-8"?>
+<p:sld xmlns:a="http://schemas.openxmlformats.org/drawingml/2006/main" xmlns:r="http://schemas.openxmlformats.org/officeDocument/2006/relationships" xmlns:p="http://schemas.openxmlformats.org/presentationml/2006/main">
+  <p:cSld>
+    <p:spTree>
+      <p:nvGrpSpPr>
+        <p:cNvPr id="1" name=""/>
+        <p:cNvGrpSpPr/>
+        <p:nvPr/>
+      </p:nvGrpSpPr>
+      <p:grpSpPr>
+        <a:xfrm>
+          <a:off x="0" y="0"/>
+          <a:ext cx="0" cy="0"/>
+          <a:chOff x="0" y="0"/>
+          <a:chExt cx="0" cy="0"/>
+        </a:xfrm>
+      </p:grpSpPr>
+      <p:sp>
+        <p:nvSpPr>
+          <p:cNvPr id="2" name="Title 1">
+            <a:extLst>
+              <a:ext uri="{FF2B5EF4-FFF2-40B4-BE49-F238E27FC236}">
                 <a16:creationId xmlns:a16="http://schemas.microsoft.com/office/drawing/2014/main" id="{43417F06-A5F6-4000-87C4-320431295B27}"/>
               </a:ext>
             </a:extLst>
@@ -3175,7 +3855,7 @@
               <a:rPr lang="en-US" dirty="0">
                 <a:cs typeface="Calibri"/>
               </a:rPr>
-              <a:t>Redis cluster provides high throughput cache.</a:t>
+              <a:t>Redis cluster provides high throughput cache cluster.</a:t>
             </a:r>
           </a:p>
           <a:p>
@@ -3247,7 +3927,7 @@
               <a:rPr lang="en-US" dirty="0">
                 <a:cs typeface="Calibri"/>
               </a:rPr>
-              <a:t>For the user to set Rules uses the API Token which is provided and set in user's device at the time of user registration and logging in to application.</a:t>
+              <a:t>User App uses the API Token which is provided and set on user's device at the time of user registration and logging in to application.</a:t>
             </a:r>
           </a:p>
           <a:p>
@@ -3263,12 +3943,8 @@
                 <a:ea typeface="+mn-lt"/>
                 <a:cs typeface="+mn-lt"/>
               </a:rPr>
-              <a:t> There are many Vehicular cloud computing solutions which provide secure communication between vehicle and server** </a:t>
-            </a:r>
-            <a:endParaRPr lang="en-US"/>
-          </a:p>
-          <a:p>
-            <a:pPr lvl="1"/>
+              <a:t> There are many Vehicular cloud computing solutions which provide secure communication between vehicle and server**</a:t>
+            </a:r>
             <a:endParaRPr lang="en-US" dirty="0">
               <a:cs typeface="Calibri"/>
             </a:endParaRPr>
@@ -3347,9 +4023,16 @@
             <p:ph type="title"/>
           </p:nvPr>
         </p:nvSpPr>
-        <p:spPr/>
-        <p:txBody>
-          <a:bodyPr/>
+        <p:spPr>
+          <a:xfrm>
+            <a:off x="90399" y="57485"/>
+            <a:ext cx="10515600" cy="539899"/>
+          </a:xfrm>
+        </p:spPr>
+        <p:txBody>
+          <a:bodyPr>
+            <a:normAutofit fontScale="90000"/>
+          </a:bodyPr>
           <a:lstStyle/>
           <a:p>
             <a:r>
@@ -3380,7 +4063,7 @@
         </p:nvSpPr>
         <p:spPr>
           <a:xfrm>
-            <a:off x="292444" y="1382842"/>
+            <a:off x="159922" y="597177"/>
             <a:ext cx="11586518" cy="2765553"/>
           </a:xfrm>
         </p:spPr>
@@ -3397,28 +4080,26 @@
               <a:rPr lang="en-US" dirty="0">
                 <a:cs typeface="Calibri"/>
               </a:rPr>
-              <a:t>Remote Management Of Car Head Unit is a  client-server system, The user of this system can use this system to manage several things for any car registered.</a:t>
+              <a:t>Remote Management Of Car Head Unit is a UI based client-server system. The registed user of this system can use this application to manage several things </a:t>
             </a:r>
             <a:r>
               <a:rPr lang="en-US">
                 <a:cs typeface="Calibri"/>
               </a:rPr>
-              <a:t> Such as GPS location, milage / liter, engine heat </a:t>
+              <a:t>including rule based monitoring and health check. The user can monitor GPS </a:t>
             </a:r>
             <a:r>
               <a:rPr lang="en-US" dirty="0">
                 <a:cs typeface="Calibri"/>
               </a:rPr>
-              <a:t>signatures, OIL level, Batery life, Kilometer driven and also service due etc.</a:t>
-            </a:r>
-          </a:p>
-          <a:p>
-            <a:pPr marL="0" indent="0">
-              <a:buNone/>
-            </a:pPr>
-            <a:endParaRPr lang="en-US" dirty="0">
-              <a:cs typeface="Calibri"/>
-            </a:endParaRPr>
+              <a:t>location, milage / liter, engine heat signatures, OIL level, Batery life, Kilometer </a:t>
+            </a:r>
+            <a:r>
+              <a:rPr lang="en-US">
+                <a:cs typeface="Calibri"/>
+              </a:rPr>
+              <a:t>driven and also service due etc.</a:t>
+            </a:r>
           </a:p>
           <a:p>
             <a:pPr marL="0" indent="0">
@@ -3478,12 +4159,14 @@
         </p:nvSpPr>
         <p:spPr>
           <a:xfrm>
-            <a:off x="311448" y="160561"/>
-            <a:ext cx="10515600" cy="1325563"/>
+            <a:off x="65336" y="75368"/>
+            <a:ext cx="10515600" cy="530433"/>
           </a:xfrm>
         </p:spPr>
         <p:txBody>
-          <a:bodyPr/>
+          <a:bodyPr>
+            <a:normAutofit fontScale="90000"/>
+          </a:bodyPr>
           <a:lstStyle/>
           <a:p>
             <a:r>
@@ -3515,7 +4198,7 @@
         </p:nvSpPr>
         <p:spPr>
           <a:xfrm>
-            <a:off x="480214" y="1355129"/>
+            <a:off x="148910" y="701986"/>
             <a:ext cx="11398748" cy="4945401"/>
           </a:xfrm>
         </p:spPr>
@@ -3533,7 +4216,7 @@
                 <a:ea typeface="+mn-lt"/>
                 <a:cs typeface="+mn-lt"/>
               </a:rPr>
-              <a:t>As per this new requirement we have to provide a new feature to the client called</a:t>
+              <a:t>As per this new requirement we have to provide a new feature to the client, called</a:t>
             </a:r>
             <a:endParaRPr lang="en-US" b="1" dirty="0">
               <a:ea typeface="+mn-lt"/>
@@ -3626,29 +4309,23 @@
                 <a:ea typeface="+mn-lt"/>
                 <a:cs typeface="+mn-lt"/>
               </a:rPr>
-              <a:t>any time</a:t>
-            </a:r>
-            <a:r>
-              <a:rPr lang="en-US" dirty="0">
-                <a:ea typeface="+mn-lt"/>
-                <a:cs typeface="+mn-lt"/>
-              </a:rPr>
-              <a:t>.</a:t>
-            </a:r>
-            <a:endParaRPr lang="en-US" dirty="0"/>
-          </a:p>
-          <a:p>
-            <a:pPr indent="0">
+              <a:t>any time.</a:t>
+            </a:r>
+          </a:p>
+          <a:p>
+            <a:pPr marL="0" indent="0">
               <a:buNone/>
             </a:pPr>
             <a:r>
-              <a:rPr lang="en-US" b="1" dirty="0">
+              <a:rPr lang="en-US" b="1">
                 <a:ea typeface="+mn-lt"/>
                 <a:cs typeface="+mn-lt"/>
               </a:rPr>
               <a:t>Non-Functional Requirements:</a:t>
             </a:r>
-            <a:endParaRPr lang="en-US" dirty="0"/>
+            <a:endParaRPr lang="en-US">
+              <a:cs typeface="Calibri" panose="020F0502020204030204"/>
+            </a:endParaRPr>
           </a:p>
           <a:p>
             <a:pPr>
@@ -3674,7 +4351,7 @@
                 <a:ea typeface="+mn-lt"/>
                 <a:cs typeface="+mn-lt"/>
               </a:rPr>
-              <a:t>The system should be highly available. The system should be up and running at any point in time for the user to not miss the notification.</a:t>
+              <a:t>The system should be highly available. The system should be up and running at any point in time so that the user does not miss the notification.</a:t>
             </a:r>
             <a:endParaRPr lang="en-US"/>
           </a:p>
@@ -3722,7 +4399,7 @@
                 <a:ea typeface="+mn-lt"/>
                 <a:cs typeface="+mn-lt"/>
               </a:rPr>
-              <a:t> Vehicle tracking.</a:t>
+              <a:t> Vehicle tracking</a:t>
             </a:r>
             <a:endParaRPr lang="en-US"/>
           </a:p>
@@ -3774,9 +4451,16 @@
             <p:ph type="title"/>
           </p:nvPr>
         </p:nvSpPr>
-        <p:spPr/>
-        <p:txBody>
-          <a:bodyPr/>
+        <p:spPr>
+          <a:xfrm>
+            <a:off x="43069" y="71684"/>
+            <a:ext cx="10515600" cy="558831"/>
+          </a:xfrm>
+        </p:spPr>
+        <p:txBody>
+          <a:bodyPr>
+            <a:normAutofit fontScale="90000"/>
+          </a:bodyPr>
           <a:lstStyle/>
           <a:p>
             <a:r>
@@ -3809,7 +4493,7 @@
         </p:nvSpPr>
         <p:spPr>
           <a:xfrm>
-            <a:off x="652849" y="1465220"/>
+            <a:off x="113296" y="670090"/>
             <a:ext cx="11226113" cy="4835310"/>
           </a:xfrm>
         </p:spPr>
@@ -3958,7 +4642,7 @@
         </p:nvSpPr>
         <p:spPr>
           <a:xfrm>
-            <a:off x="203988" y="156876"/>
+            <a:off x="109330" y="43286"/>
             <a:ext cx="10297887" cy="653487"/>
           </a:xfrm>
         </p:spPr>
@@ -3997,7 +4681,7 @@
         </p:nvSpPr>
         <p:spPr>
           <a:xfrm>
-            <a:off x="232386" y="916905"/>
+            <a:off x="156659" y="737054"/>
             <a:ext cx="11040762" cy="5326830"/>
           </a:xfrm>
         </p:spPr>
@@ -4016,21 +4700,7 @@
                 <a:ea typeface="+mn-lt"/>
                 <a:cs typeface="+mn-lt"/>
               </a:rPr>
-              <a:t>We can have SOAP or REST APIs to expose the functionality of our service. The following could be the definitions of the APIs for setting vehicle </a:t>
-            </a:r>
-            <a:r>
-              <a:rPr lang="en-US" err="1">
-                <a:ea typeface="+mn-lt"/>
-                <a:cs typeface="+mn-lt"/>
-              </a:rPr>
-              <a:t>secrity</a:t>
-            </a:r>
-            <a:r>
-              <a:rPr lang="en-US">
-                <a:ea typeface="+mn-lt"/>
-                <a:cs typeface="+mn-lt"/>
-              </a:rPr>
-              <a:t> configuration:</a:t>
+              <a:t>We can have SOAP or REST APIs to expose the functionality of our service. The following could be the definitions of the APIs for setting vehicle security configuration:</a:t>
             </a:r>
           </a:p>
           <a:p>
@@ -4046,7 +4716,7 @@
               <a:t>~~/</a:t>
             </a:r>
             <a:r>
-              <a:rPr lang="en-US" sz="1800" dirty="0" err="1">
+              <a:rPr lang="en-US" sz="1800" err="1">
                 <a:ea typeface="+mn-lt"/>
                 <a:cs typeface="+mn-lt"/>
               </a:rPr>
@@ -4083,7 +4753,7 @@
                 <a:ea typeface="+mn-lt"/>
                 <a:cs typeface="+mn-lt"/>
               </a:rPr>
-              <a:t>setSecurityConfig(api_token, user_id, title, description, locations[], notification_type, message_language, notification_details, </a:t>
+              <a:t>setSecurityConfig(api_token, user_id, name, description, locations[], notification_type, message_language, notification_details, </a:t>
             </a:r>
             <a:r>
               <a:rPr lang="en-US" sz="1800" err="1">
@@ -4156,7 +4826,7 @@
                 <a:ea typeface="+mn-lt"/>
                 <a:cs typeface="+mn-lt"/>
               </a:rPr>
-              <a:t>title (string): Title of security configuration.</a:t>
+              <a:t>name(string): Name of security configuration.</a:t>
             </a:r>
             <a:br>
               <a:rPr lang="en-US" sz="1800" dirty="0">
@@ -4242,21 +4912,7 @@
                 <a:ea typeface="+mn-lt"/>
                 <a:cs typeface="+mn-lt"/>
               </a:rPr>
-              <a:t> (string): How many </a:t>
-            </a:r>
-            <a:r>
-              <a:rPr lang="en-US" sz="1800" err="1">
-                <a:ea typeface="+mn-lt"/>
-                <a:cs typeface="+mn-lt"/>
-              </a:rPr>
-              <a:t>receipients</a:t>
-            </a:r>
-            <a:r>
-              <a:rPr lang="en-US" sz="1800">
-                <a:ea typeface="+mn-lt"/>
-                <a:cs typeface="+mn-lt"/>
-              </a:rPr>
-              <a:t>, retry till stop message or time limit, frequency, escalation, etc. </a:t>
+              <a:t> (string): How many reciepients, retry till stop message or time limit, frequency, escalation, etc. </a:t>
             </a:r>
             <a:br>
               <a:rPr lang="en-US" sz="1800" dirty="0">
@@ -4276,14 +4932,7 @@
                 <a:ea typeface="+mn-lt"/>
                 <a:cs typeface="+mn-lt"/>
               </a:rPr>
-              <a:t> (string): </a:t>
-            </a:r>
-            <a:r>
-              <a:rPr lang="en-US" sz="1800" err="1">
-                <a:ea typeface="+mn-lt"/>
-                <a:cs typeface="+mn-lt"/>
-              </a:rPr>
-              <a:t>Prefered</a:t>
+              <a:t> (string): Preffered</a:t>
             </a:r>
             <a:r>
               <a:rPr lang="en-US" sz="1800" dirty="0">
@@ -4384,7 +5033,7 @@
         </p:nvSpPr>
         <p:spPr>
           <a:xfrm>
-            <a:off x="203988" y="156876"/>
+            <a:off x="43069" y="62218"/>
             <a:ext cx="10297887" cy="653487"/>
           </a:xfrm>
         </p:spPr>
@@ -4423,7 +5072,7 @@
         </p:nvSpPr>
         <p:spPr>
           <a:xfrm>
-            <a:off x="232386" y="916905"/>
+            <a:off x="147193" y="765452"/>
             <a:ext cx="11040762" cy="5326830"/>
           </a:xfrm>
         </p:spPr>
@@ -4465,7 +5114,7 @@
               <a:t> Each </a:t>
             </a:r>
             <a:r>
-              <a:rPr lang="en-US" sz="1800" dirty="0" err="1">
+              <a:rPr lang="en-US" sz="1800" err="1">
                 <a:ea typeface="+mn-lt"/>
                 <a:cs typeface="+mn-lt"/>
               </a:rPr>
@@ -4476,9 +5125,30 @@
                 <a:ea typeface="+mn-lt"/>
                 <a:cs typeface="+mn-lt"/>
               </a:rPr>
-              <a:t> / sensor data will be pushed to a processing queue to be de-queued and immediately processed by stream processing system.</a:t>
-            </a:r>
-            <a:endParaRPr lang="en-US" sz="1800" dirty="0">
+              <a:t> / sensor data will be pushed to a processing queue to be de-queued and immediately </a:t>
+            </a:r>
+            <a:r>
+              <a:rPr lang="en-US" sz="1800">
+                <a:ea typeface="+mn-lt"/>
+                <a:cs typeface="+mn-lt"/>
+              </a:rPr>
+              <a:t>processed by stream processing system.</a:t>
+            </a:r>
+            <a:r>
+              <a:rPr lang="en-US" sz="1400">
+                <a:ea typeface="+mn-lt"/>
+                <a:cs typeface="+mn-lt"/>
+              </a:rPr>
+              <a:t> [ Message Format from the Vehicle :-  { Car-ID , Longitude , Latitude } </a:t>
+            </a:r>
+            <a:r>
+              <a:rPr lang="en-US" sz="1400" dirty="0">
+                <a:ea typeface="+mn-lt"/>
+                <a:cs typeface="+mn-lt"/>
+              </a:rPr>
+              <a:t>]</a:t>
+            </a:r>
+            <a:endParaRPr lang="en-US" sz="1400" dirty="0">
               <a:cs typeface="Calibri"/>
             </a:endParaRPr>
           </a:p>
@@ -4495,11 +5165,18 @@
               <a:t>Metadata DB:</a:t>
             </a:r>
             <a:r>
+              <a:rPr lang="en-US" sz="1800">
+                <a:ea typeface="+mn-lt"/>
+                <a:cs typeface="+mn-lt"/>
+              </a:rPr>
+              <a:t> The database would save user specific rules and other details for notification service to </a:t>
+            </a:r>
+            <a:r>
               <a:rPr lang="en-US" sz="1800" dirty="0">
                 <a:ea typeface="+mn-lt"/>
                 <a:cs typeface="+mn-lt"/>
               </a:rPr>
-              <a:t> The database would save user specific rules and other details on notification service to work.</a:t>
+              <a:t>work.</a:t>
             </a:r>
             <a:endParaRPr lang="en-US" dirty="0">
               <a:ea typeface="+mn-lt"/>
@@ -4523,7 +5200,21 @@
                 <a:ea typeface="+mn-lt"/>
                 <a:cs typeface="+mn-lt"/>
               </a:rPr>
-              <a:t> The cache would have latest user specific rules loaded from DB to support the streaming consumer/ stream processor</a:t>
+              <a:t> The cache would have latest user specific rules loaded from DB to support the </a:t>
+            </a:r>
+            <a:r>
+              <a:rPr lang="en-US" sz="1800">
+                <a:ea typeface="+mn-lt"/>
+                <a:cs typeface="+mn-lt"/>
+              </a:rPr>
+              <a:t>stream </a:t>
+            </a:r>
+            <a:r>
+              <a:rPr lang="en-US" sz="1800" dirty="0">
+                <a:ea typeface="+mn-lt"/>
+                <a:cs typeface="+mn-lt"/>
+              </a:rPr>
+              <a:t>processor</a:t>
             </a:r>
           </a:p>
           <a:p>
@@ -4532,32 +5223,16 @@
               <a:buChar char="•"/>
             </a:pPr>
             <a:r>
-              <a:rPr lang="en-US" sz="1800" b="1" dirty="0">
-                <a:ea typeface="+mn-lt"/>
-                <a:cs typeface="+mn-lt"/>
-              </a:rPr>
-              <a:t>Notification Service:</a:t>
+              <a:rPr lang="en-US" sz="1800" b="1">
+                <a:cs typeface="Calibri"/>
+              </a:rPr>
+              <a:t>Stream processor:</a:t>
             </a:r>
             <a:r>
               <a:rPr lang="en-US" sz="1800" dirty="0">
-                <a:ea typeface="+mn-lt"/>
-                <a:cs typeface="+mn-lt"/>
-              </a:rPr>
-              <a:t> we need a new service which reads / processes the stream of </a:t>
-            </a:r>
-            <a:r>
-              <a:rPr lang="en-US" sz="1800" dirty="0" err="1">
-                <a:ea typeface="+mn-lt"/>
-                <a:cs typeface="+mn-lt"/>
-              </a:rPr>
-              <a:t>gps</a:t>
-            </a:r>
-            <a:r>
-              <a:rPr lang="en-US" sz="1800" dirty="0">
-                <a:ea typeface="+mn-lt"/>
-                <a:cs typeface="+mn-lt"/>
-              </a:rPr>
-              <a:t> data for a specific car-id and rule-id</a:t>
+                <a:cs typeface="Calibri"/>
+              </a:rPr>
+              <a:t> We need high speed stream processing system for reading and processing data in milliseconds time interval.</a:t>
             </a:r>
           </a:p>
           <a:p>
@@ -4569,13 +5244,13 @@
               <a:rPr lang="en-US" sz="1800" b="1" dirty="0">
                 <a:cs typeface="Calibri"/>
               </a:rPr>
-              <a:t>Stream processor:</a:t>
+              <a:t>Batch Processor:</a:t>
             </a:r>
             <a:r>
               <a:rPr lang="en-US" sz="1800" dirty="0">
                 <a:cs typeface="Calibri"/>
               </a:rPr>
-              <a:t> We need high speed stream processing system for reading and processing data in milliseconds time interval.</a:t>
+              <a:t> We also need batch processing system to analyze the stream of events for reporting etc.</a:t>
             </a:r>
           </a:p>
           <a:p>
@@ -4587,13 +5262,13 @@
               <a:rPr lang="en-US" sz="1800" b="1" dirty="0">
                 <a:cs typeface="Calibri"/>
               </a:rPr>
-              <a:t>Batch Processor:</a:t>
+              <a:t>Load Balancer:</a:t>
             </a:r>
             <a:r>
               <a:rPr lang="en-US" sz="1800" dirty="0">
                 <a:cs typeface="Calibri"/>
               </a:rPr>
-              <a:t> We also need batch processing system to analyze the stream of events for reporting etc.</a:t>
+              <a:t> We need Load Balancers as we would have a scaled up version of our services for high availability.</a:t>
             </a:r>
           </a:p>
           <a:p>
@@ -4605,32 +5280,28 @@
               <a:rPr lang="en-US" sz="1800" b="1" dirty="0">
                 <a:cs typeface="Calibri"/>
               </a:rPr>
-              <a:t>Load Balancer:</a:t>
-            </a:r>
-            <a:r>
+              <a:t>Secure Network:</a:t>
+            </a:r>
+            <a:r>
+              <a:rPr lang="en-US" sz="1800">
+                <a:cs typeface="Calibri"/>
+              </a:rPr>
+              <a:t> We would need a secure network such as VPC. If we are planning to deploy over multiple Regions with two different VPCs we can have inter VPC comunication with VPC peering (No Overlay network).</a:t>
+            </a:r>
+            <a:br>
               <a:rPr lang="en-US" sz="1800" dirty="0">
                 <a:cs typeface="Calibri"/>
               </a:rPr>
-              <a:t> We need Load Balancers as we would have a scaled up version of our services for high availability.</a:t>
-            </a:r>
-          </a:p>
-          <a:p>
-            <a:pPr>
-              <a:buFont typeface="Arial"/>
-              <a:buChar char="•"/>
-            </a:pPr>
-            <a:r>
-              <a:rPr lang="en-US" sz="1800" b="1" dirty="0">
+            </a:br>
+            <a:r>
+              <a:rPr lang="en-US" sz="1800">
                 <a:cs typeface="Calibri"/>
               </a:rPr>
-              <a:t>Secure Network:</a:t>
-            </a:r>
-            <a:r>
-              <a:rPr lang="en-US" sz="1800" dirty="0">
-                <a:cs typeface="Calibri"/>
-              </a:rPr>
-              <a:t> We would need a secure network.</a:t>
-            </a:r>
+              <a:t>We can have many AZs (In the same region) tagged to a VPC with highspeed comunication lines.</a:t>
+            </a:r>
+            <a:endParaRPr lang="en-US" sz="1800" dirty="0">
+              <a:cs typeface="Calibri"/>
+            </a:endParaRPr>
           </a:p>
         </p:txBody>
       </p:sp>
@@ -4682,7 +5353,7 @@
         </p:nvSpPr>
         <p:spPr>
           <a:xfrm>
-            <a:off x="203988" y="156876"/>
+            <a:off x="62000" y="52752"/>
             <a:ext cx="10297887" cy="653487"/>
           </a:xfrm>
         </p:spPr>
@@ -4721,7 +5392,7 @@
         </p:nvSpPr>
         <p:spPr>
           <a:xfrm>
-            <a:off x="232386" y="765452"/>
+            <a:off x="151926" y="651862"/>
             <a:ext cx="11883221" cy="5478283"/>
           </a:xfrm>
         </p:spPr>
@@ -4740,14 +5411,7 @@
                 <a:ea typeface="+mn-lt"/>
                 <a:cs typeface="+mn-lt"/>
               </a:rPr>
-              <a:t>Notification rules metadata storage - </a:t>
-            </a:r>
-            <a:r>
-              <a:rPr lang="en-US" b="1">
-                <a:ea typeface="+mn-lt"/>
-                <a:cs typeface="+mn-lt"/>
-              </a:rPr>
-              <a:t>MySql / MongoDB</a:t>
+              <a:t>Notification rules metadata storage - MySQL / MongoDB</a:t>
             </a:r>
             <a:endParaRPr lang="en-US" dirty="0" err="1"/>
           </a:p>
@@ -4778,13 +5442,13 @@
           <p:nvPr>
             <p:extLst>
               <p:ext uri="{D42A27DB-BD31-4B8C-83A1-F6EECF244321}">
-                <p14:modId xmlns:p14="http://schemas.microsoft.com/office/powerpoint/2010/main" val="2726542171"/>
+                <p14:modId xmlns:p14="http://schemas.microsoft.com/office/powerpoint/2010/main" val="855710442"/>
               </p:ext>
             </p:extLst>
           </p:nvPr>
         </p:nvGraphicFramePr>
         <p:xfrm>
-          <a:off x="601080" y="1424608"/>
+          <a:off x="326571" y="1159565"/>
           <a:ext cx="11491087" cy="4820263"/>
         </p:xfrm>
         <a:graphic>
@@ -5070,16 +5734,10 @@
                         <a:buChar char="•"/>
                       </a:pPr>
                       <a:r>
-                        <a:rPr lang="en-US" sz="1800" b="1" i="0" u="none" strike="noStrike" noProof="0">
-                          <a:latin typeface="Calibri"/>
-                        </a:rPr>
-                        <a:t>Car / Vehicle</a:t>
-                      </a:r>
-                      <a:r>
                         <a:rPr lang="en-US" sz="1800" b="1" i="0" u="none" strike="noStrike" noProof="0" dirty="0">
                           <a:latin typeface="Calibri"/>
                         </a:rPr>
-                        <a:t> Id</a:t>
+                        <a:t>Car / Vehicle Id</a:t>
                       </a:r>
                     </a:p>
                     <a:p>
@@ -5103,7 +5761,7 @@
                         <a:rPr lang="en-US" sz="1800" b="0" i="0" u="none" strike="noStrike" noProof="0" dirty="0">
                           <a:latin typeface="Calibri"/>
                         </a:rPr>
-                        <a:t>Title</a:t>
+                        <a:t>Name</a:t>
                       </a:r>
                     </a:p>
                     <a:p>
@@ -5502,7 +6160,7 @@
                         <a:buChar char="•"/>
                       </a:pPr>
                       <a:r>
-                        <a:rPr lang="en-US" sz="1800" b="1" i="0" u="none" strike="noStrike" noProof="0"/>
+                        <a:rPr lang="en-US" sz="1800" b="1" i="0" u="none" strike="noStrike" noProof="0" dirty="0"/>
                         <a:t>User ID</a:t>
                       </a:r>
                       <a:endParaRPr lang="en-US" sz="1800" b="1" i="0" u="none" strike="noStrike" noProof="0" dirty="0">
@@ -5613,13 +6271,9 @@
                       </a:pPr>
                       <a:r>
                         <a:rPr lang="en-US" sz="1800" b="0" i="0" u="none" strike="noStrike" noProof="0" dirty="0"/>
-                        <a:t>registration</a:t>
+                        <a:t>registration details, etc.</a:t>
                       </a:r>
-                      <a:r>
-                        <a:rPr lang="en-US" sz="1800" b="0" i="0" u="none" strike="noStrike" noProof="0"/>
-                        <a:t> details, etc.</a:t>
-                      </a:r>
-                      <a:endParaRPr lang="en-US" sz="1800" b="0" i="0" u="none" strike="noStrike" noProof="0">
+                      <a:endParaRPr lang="en-US" sz="1800" b="0" i="0" u="none" strike="noStrike" noProof="0" dirty="0">
                         <a:latin typeface="Calibri"/>
                       </a:endParaRPr>
                     </a:p>
@@ -5706,9 +6360,16 @@
             <p:ph type="title"/>
           </p:nvPr>
         </p:nvSpPr>
-        <p:spPr/>
-        <p:txBody>
-          <a:bodyPr/>
+        <p:spPr>
+          <a:xfrm>
+            <a:off x="71467" y="62218"/>
+            <a:ext cx="10515600" cy="549365"/>
+          </a:xfrm>
+        </p:spPr>
+        <p:txBody>
+          <a:bodyPr>
+            <a:normAutofit fontScale="90000"/>
+          </a:bodyPr>
           <a:lstStyle/>
           <a:p>
             <a:r>
@@ -5747,8 +6408,8 @@
         </p:blipFill>
         <p:spPr>
           <a:xfrm>
-            <a:off x="516664" y="1825625"/>
-            <a:ext cx="10555208" cy="4351338"/>
+            <a:off x="161695" y="822246"/>
+            <a:ext cx="11629580" cy="5335785"/>
           </a:xfrm>
         </p:spPr>
       </p:pic>
@@ -5798,9 +6459,16 @@
             <p:ph type="title"/>
           </p:nvPr>
         </p:nvSpPr>
-        <p:spPr/>
-        <p:txBody>
-          <a:bodyPr/>
+        <p:spPr>
+          <a:xfrm>
+            <a:off x="109330" y="100082"/>
+            <a:ext cx="10515600" cy="492570"/>
+          </a:xfrm>
+        </p:spPr>
+        <p:txBody>
+          <a:bodyPr>
+            <a:normAutofit fontScale="90000"/>
+          </a:bodyPr>
           <a:lstStyle/>
           <a:p>
             <a:r>
@@ -5838,8 +6506,8 @@
         </p:blipFill>
         <p:spPr>
           <a:xfrm>
-            <a:off x="597591" y="1310760"/>
-            <a:ext cx="10821764" cy="5411959"/>
+            <a:off x="181094" y="723878"/>
+            <a:ext cx="11579031" cy="5667536"/>
           </a:xfrm>
         </p:spPr>
       </p:pic>

</xml_diff>